<commit_message>
updating logic and layout
</commit_message>
<xml_diff>
--- a/fixes.pptx
+++ b/fixes.pptx
@@ -6,10 +6,12 @@
   </p:sldMasterIdLst>
   <p:sldIdLst>
     <p:sldId id="256" r:id="rId2"/>
-    <p:sldId id="257" r:id="rId3"/>
-    <p:sldId id="258" r:id="rId4"/>
-    <p:sldId id="259" r:id="rId5"/>
-    <p:sldId id="260" r:id="rId6"/>
+    <p:sldId id="262" r:id="rId3"/>
+    <p:sldId id="257" r:id="rId4"/>
+    <p:sldId id="261" r:id="rId5"/>
+    <p:sldId id="258" r:id="rId6"/>
+    <p:sldId id="259" r:id="rId7"/>
+    <p:sldId id="260" r:id="rId8"/>
   </p:sldIdLst>
   <p:sldSz cx="12192000" cy="6858000"/>
   <p:notesSz cx="6858000" cy="9144000"/>
@@ -108,6 +110,11 @@
       </a:defRPr>
     </a:lvl9pPr>
   </p:defaultTextStyle>
+  <p:extLst>
+    <p:ext uri="{EFAFB233-063F-42B5-8137-9DF3F51BA10A}">
+      <p15:sldGuideLst xmlns:p15="http://schemas.microsoft.com/office/powerpoint/2012/main"/>
+    </p:ext>
+  </p:extLst>
 </p:presentation>
 </file>
 
@@ -258,7 +265,7 @@
           <a:p>
             <a:fld id="{AE8F14BE-FF8A-CE45-BC5E-071F9DD5EAAE}" type="datetimeFigureOut">
               <a:rPr lang="en-GB" smtClean="0"/>
-              <a:t>28/09/2025</a:t>
+              <a:t>30/10/2025</a:t>
             </a:fld>
             <a:endParaRPr lang="en-GB"/>
           </a:p>
@@ -456,7 +463,7 @@
           <a:p>
             <a:fld id="{AE8F14BE-FF8A-CE45-BC5E-071F9DD5EAAE}" type="datetimeFigureOut">
               <a:rPr lang="en-GB" smtClean="0"/>
-              <a:t>28/09/2025</a:t>
+              <a:t>30/10/2025</a:t>
             </a:fld>
             <a:endParaRPr lang="en-GB"/>
           </a:p>
@@ -664,7 +671,7 @@
           <a:p>
             <a:fld id="{AE8F14BE-FF8A-CE45-BC5E-071F9DD5EAAE}" type="datetimeFigureOut">
               <a:rPr lang="en-GB" smtClean="0"/>
-              <a:t>28/09/2025</a:t>
+              <a:t>30/10/2025</a:t>
             </a:fld>
             <a:endParaRPr lang="en-GB"/>
           </a:p>
@@ -862,7 +869,7 @@
           <a:p>
             <a:fld id="{AE8F14BE-FF8A-CE45-BC5E-071F9DD5EAAE}" type="datetimeFigureOut">
               <a:rPr lang="en-GB" smtClean="0"/>
-              <a:t>28/09/2025</a:t>
+              <a:t>30/10/2025</a:t>
             </a:fld>
             <a:endParaRPr lang="en-GB"/>
           </a:p>
@@ -1137,7 +1144,7 @@
           <a:p>
             <a:fld id="{AE8F14BE-FF8A-CE45-BC5E-071F9DD5EAAE}" type="datetimeFigureOut">
               <a:rPr lang="en-GB" smtClean="0"/>
-              <a:t>28/09/2025</a:t>
+              <a:t>30/10/2025</a:t>
             </a:fld>
             <a:endParaRPr lang="en-GB"/>
           </a:p>
@@ -1402,7 +1409,7 @@
           <a:p>
             <a:fld id="{AE8F14BE-FF8A-CE45-BC5E-071F9DD5EAAE}" type="datetimeFigureOut">
               <a:rPr lang="en-GB" smtClean="0"/>
-              <a:t>28/09/2025</a:t>
+              <a:t>30/10/2025</a:t>
             </a:fld>
             <a:endParaRPr lang="en-GB"/>
           </a:p>
@@ -1814,7 +1821,7 @@
           <a:p>
             <a:fld id="{AE8F14BE-FF8A-CE45-BC5E-071F9DD5EAAE}" type="datetimeFigureOut">
               <a:rPr lang="en-GB" smtClean="0"/>
-              <a:t>28/09/2025</a:t>
+              <a:t>30/10/2025</a:t>
             </a:fld>
             <a:endParaRPr lang="en-GB"/>
           </a:p>
@@ -1955,7 +1962,7 @@
           <a:p>
             <a:fld id="{AE8F14BE-FF8A-CE45-BC5E-071F9DD5EAAE}" type="datetimeFigureOut">
               <a:rPr lang="en-GB" smtClean="0"/>
-              <a:t>28/09/2025</a:t>
+              <a:t>30/10/2025</a:t>
             </a:fld>
             <a:endParaRPr lang="en-GB"/>
           </a:p>
@@ -2068,7 +2075,7 @@
           <a:p>
             <a:fld id="{AE8F14BE-FF8A-CE45-BC5E-071F9DD5EAAE}" type="datetimeFigureOut">
               <a:rPr lang="en-GB" smtClean="0"/>
-              <a:t>28/09/2025</a:t>
+              <a:t>30/10/2025</a:t>
             </a:fld>
             <a:endParaRPr lang="en-GB"/>
           </a:p>
@@ -2379,7 +2386,7 @@
           <a:p>
             <a:fld id="{AE8F14BE-FF8A-CE45-BC5E-071F9DD5EAAE}" type="datetimeFigureOut">
               <a:rPr lang="en-GB" smtClean="0"/>
-              <a:t>28/09/2025</a:t>
+              <a:t>30/10/2025</a:t>
             </a:fld>
             <a:endParaRPr lang="en-GB"/>
           </a:p>
@@ -2667,7 +2674,7 @@
           <a:p>
             <a:fld id="{AE8F14BE-FF8A-CE45-BC5E-071F9DD5EAAE}" type="datetimeFigureOut">
               <a:rPr lang="en-GB" smtClean="0"/>
-              <a:t>28/09/2025</a:t>
+              <a:t>30/10/2025</a:t>
             </a:fld>
             <a:endParaRPr lang="en-GB"/>
           </a:p>
@@ -2908,7 +2915,7 @@
           <a:p>
             <a:fld id="{AE8F14BE-FF8A-CE45-BC5E-071F9DD5EAAE}" type="datetimeFigureOut">
               <a:rPr lang="en-GB" smtClean="0"/>
-              <a:t>28/09/2025</a:t>
+              <a:t>30/10/2025</a:t>
             </a:fld>
             <a:endParaRPr lang="en-GB"/>
           </a:p>
@@ -3405,6 +3412,1108 @@
           <a:chExt cx="0" cy="0"/>
         </a:xfrm>
       </p:grpSpPr>
+      <p:sp>
+        <p:nvSpPr>
+          <p:cNvPr id="2" name="Title 1">
+            <a:extLst>
+              <a:ext uri="{FF2B5EF4-FFF2-40B4-BE49-F238E27FC236}">
+                <a16:creationId xmlns:a16="http://schemas.microsoft.com/office/drawing/2014/main" id="{4DD28B73-5CE9-0961-F254-ADDB0F93DABA}"/>
+              </a:ext>
+            </a:extLst>
+          </p:cNvPr>
+          <p:cNvSpPr>
+            <a:spLocks noGrp="1"/>
+          </p:cNvSpPr>
+          <p:nvPr>
+            <p:ph type="title"/>
+          </p:nvPr>
+        </p:nvSpPr>
+        <p:spPr/>
+        <p:txBody>
+          <a:bodyPr/>
+          <a:lstStyle/>
+          <a:p>
+            <a:r>
+              <a:rPr lang="en-GB" dirty="0"/>
+              <a:t>Info for header page</a:t>
+            </a:r>
+          </a:p>
+        </p:txBody>
+      </p:sp>
+      <p:sp>
+        <p:nvSpPr>
+          <p:cNvPr id="4" name="Rectangle 1">
+            <a:extLst>
+              <a:ext uri="{FF2B5EF4-FFF2-40B4-BE49-F238E27FC236}">
+                <a16:creationId xmlns:a16="http://schemas.microsoft.com/office/drawing/2014/main" id="{A72A3E84-5E7E-D47E-0C93-D5E5DC0906C2}"/>
+              </a:ext>
+            </a:extLst>
+          </p:cNvPr>
+          <p:cNvSpPr>
+            <a:spLocks noGrp="1" noChangeArrowheads="1"/>
+          </p:cNvSpPr>
+          <p:nvPr>
+            <p:ph idx="1"/>
+          </p:nvPr>
+        </p:nvSpPr>
+        <p:spPr bwMode="auto">
+          <a:xfrm>
+            <a:off x="838200" y="2908687"/>
+            <a:ext cx="5737468" cy="2185214"/>
+          </a:xfrm>
+          <a:prstGeom prst="rect">
+            <a:avLst/>
+          </a:prstGeom>
+          <a:noFill/>
+          <a:ln>
+            <a:noFill/>
+          </a:ln>
+          <a:effectLst/>
+          <a:extLst>
+            <a:ext uri="{909E8E84-426E-40DD-AFC4-6F175D3DCCD1}">
+              <a14:hiddenFill xmlns:a14="http://schemas.microsoft.com/office/drawing/2010/main">
+                <a:solidFill>
+                  <a:schemeClr val="accent1"/>
+                </a:solidFill>
+              </a14:hiddenFill>
+            </a:ext>
+            <a:ext uri="{91240B29-F687-4F45-9708-019B960494DF}">
+              <a14:hiddenLine xmlns:a14="http://schemas.microsoft.com/office/drawing/2010/main" w="9525">
+                <a:solidFill>
+                  <a:schemeClr val="tx1"/>
+                </a:solidFill>
+                <a:miter lim="800000"/>
+                <a:headEnd/>
+                <a:tailEnd/>
+              </a14:hiddenLine>
+            </a:ext>
+            <a:ext uri="{AF507438-7753-43E0-B8FC-AC1667EBCBE1}">
+              <a14:hiddenEffects xmlns:a14="http://schemas.microsoft.com/office/drawing/2010/main">
+                <a:effectLst>
+                  <a:outerShdw dist="35921" dir="2700000" algn="ctr" rotWithShape="0">
+                    <a:schemeClr val="bg2"/>
+                  </a:outerShdw>
+                </a:effectLst>
+              </a14:hiddenEffects>
+            </a:ext>
+          </a:extLst>
+        </p:spPr>
+        <p:txBody>
+          <a:bodyPr vert="horz" wrap="none" lIns="91440" tIns="45720" rIns="91440" bIns="45720" numCol="1" anchor="ctr" anchorCtr="0" compatLnSpc="1">
+            <a:prstTxWarp prst="textNoShape">
+              <a:avLst/>
+            </a:prstTxWarp>
+            <a:spAutoFit/>
+          </a:bodyPr>
+          <a:lstStyle>
+            <a:lvl1pPr eaLnBrk="0" fontAlgn="base" hangingPunct="0">
+              <a:spcBef>
+                <a:spcPct val="0"/>
+              </a:spcBef>
+              <a:spcAft>
+                <a:spcPct val="0"/>
+              </a:spcAft>
+              <a:defRPr>
+                <a:solidFill>
+                  <a:schemeClr val="tx1"/>
+                </a:solidFill>
+                <a:latin typeface="Arial" panose="020B0604020202020204" pitchFamily="34" charset="0"/>
+              </a:defRPr>
+            </a:lvl1pPr>
+            <a:lvl2pPr eaLnBrk="0" fontAlgn="base" hangingPunct="0">
+              <a:spcBef>
+                <a:spcPct val="0"/>
+              </a:spcBef>
+              <a:spcAft>
+                <a:spcPct val="0"/>
+              </a:spcAft>
+              <a:defRPr>
+                <a:solidFill>
+                  <a:schemeClr val="tx1"/>
+                </a:solidFill>
+                <a:latin typeface="Arial" panose="020B0604020202020204" pitchFamily="34" charset="0"/>
+              </a:defRPr>
+            </a:lvl2pPr>
+            <a:lvl3pPr eaLnBrk="0" fontAlgn="base" hangingPunct="0">
+              <a:spcBef>
+                <a:spcPct val="0"/>
+              </a:spcBef>
+              <a:spcAft>
+                <a:spcPct val="0"/>
+              </a:spcAft>
+              <a:defRPr>
+                <a:solidFill>
+                  <a:schemeClr val="tx1"/>
+                </a:solidFill>
+                <a:latin typeface="Arial" panose="020B0604020202020204" pitchFamily="34" charset="0"/>
+              </a:defRPr>
+            </a:lvl3pPr>
+            <a:lvl4pPr eaLnBrk="0" fontAlgn="base" hangingPunct="0">
+              <a:spcBef>
+                <a:spcPct val="0"/>
+              </a:spcBef>
+              <a:spcAft>
+                <a:spcPct val="0"/>
+              </a:spcAft>
+              <a:defRPr>
+                <a:solidFill>
+                  <a:schemeClr val="tx1"/>
+                </a:solidFill>
+                <a:latin typeface="Arial" panose="020B0604020202020204" pitchFamily="34" charset="0"/>
+              </a:defRPr>
+            </a:lvl4pPr>
+            <a:lvl5pPr eaLnBrk="0" fontAlgn="base" hangingPunct="0">
+              <a:spcBef>
+                <a:spcPct val="0"/>
+              </a:spcBef>
+              <a:spcAft>
+                <a:spcPct val="0"/>
+              </a:spcAft>
+              <a:defRPr>
+                <a:solidFill>
+                  <a:schemeClr val="tx1"/>
+                </a:solidFill>
+                <a:latin typeface="Arial" panose="020B0604020202020204" pitchFamily="34" charset="0"/>
+              </a:defRPr>
+            </a:lvl5pPr>
+            <a:lvl6pPr eaLnBrk="0" fontAlgn="base" hangingPunct="0">
+              <a:spcBef>
+                <a:spcPct val="0"/>
+              </a:spcBef>
+              <a:spcAft>
+                <a:spcPct val="0"/>
+              </a:spcAft>
+              <a:defRPr>
+                <a:solidFill>
+                  <a:schemeClr val="tx1"/>
+                </a:solidFill>
+                <a:latin typeface="Arial" panose="020B0604020202020204" pitchFamily="34" charset="0"/>
+              </a:defRPr>
+            </a:lvl6pPr>
+            <a:lvl7pPr eaLnBrk="0" fontAlgn="base" hangingPunct="0">
+              <a:spcBef>
+                <a:spcPct val="0"/>
+              </a:spcBef>
+              <a:spcAft>
+                <a:spcPct val="0"/>
+              </a:spcAft>
+              <a:defRPr>
+                <a:solidFill>
+                  <a:schemeClr val="tx1"/>
+                </a:solidFill>
+                <a:latin typeface="Arial" panose="020B0604020202020204" pitchFamily="34" charset="0"/>
+              </a:defRPr>
+            </a:lvl7pPr>
+            <a:lvl8pPr eaLnBrk="0" fontAlgn="base" hangingPunct="0">
+              <a:spcBef>
+                <a:spcPct val="0"/>
+              </a:spcBef>
+              <a:spcAft>
+                <a:spcPct val="0"/>
+              </a:spcAft>
+              <a:defRPr>
+                <a:solidFill>
+                  <a:schemeClr val="tx1"/>
+                </a:solidFill>
+                <a:latin typeface="Arial" panose="020B0604020202020204" pitchFamily="34" charset="0"/>
+              </a:defRPr>
+            </a:lvl8pPr>
+            <a:lvl9pPr eaLnBrk="0" fontAlgn="base" hangingPunct="0">
+              <a:spcBef>
+                <a:spcPct val="0"/>
+              </a:spcBef>
+              <a:spcAft>
+                <a:spcPct val="0"/>
+              </a:spcAft>
+              <a:defRPr>
+                <a:solidFill>
+                  <a:schemeClr val="tx1"/>
+                </a:solidFill>
+                <a:latin typeface="Arial" panose="020B0604020202020204" pitchFamily="34" charset="0"/>
+              </a:defRPr>
+            </a:lvl9pPr>
+          </a:lstStyle>
+          <a:p>
+            <a:pPr marL="0" marR="0" lvl="0" indent="0" algn="l" defTabSz="914400" rtl="0" eaLnBrk="0" fontAlgn="base" latinLnBrk="0" hangingPunct="0">
+              <a:lnSpc>
+                <a:spcPct val="100000"/>
+              </a:lnSpc>
+              <a:spcBef>
+                <a:spcPct val="0"/>
+              </a:spcBef>
+              <a:spcAft>
+                <a:spcPct val="0"/>
+              </a:spcAft>
+              <a:buClrTx/>
+              <a:buSzTx/>
+              <a:buFontTx/>
+              <a:buNone/>
+              <a:tabLst/>
+            </a:pPr>
+            <a:r>
+              <a:rPr kumimoji="0" lang="en-US" altLang="en-US" sz="1000" b="0" i="0" u="none" strike="noStrike" cap="none" normalizeH="0" baseline="0" dirty="0">
+                <a:ln>
+                  <a:noFill/>
+                </a:ln>
+                <a:solidFill>
+                  <a:srgbClr val="333D42"/>
+                </a:solidFill>
+                <a:effectLst/>
+                <a:latin typeface="-apple-system"/>
+              </a:rPr>
+              <a:t>For example, if we look at the North West &amp; Central region standard dwell times at stations:</a:t>
+            </a:r>
+            <a:endParaRPr kumimoji="0" lang="en-US" altLang="en-US" sz="1000" b="0" i="0" u="none" strike="noStrike" cap="none" normalizeH="0" baseline="0" dirty="0">
+              <a:ln>
+                <a:noFill/>
+              </a:ln>
+              <a:solidFill>
+                <a:schemeClr val="tx1"/>
+              </a:solidFill>
+              <a:effectLst/>
+            </a:endParaRPr>
+          </a:p>
+          <a:p>
+            <a:pPr marL="0" marR="0" lvl="0" indent="0" algn="l" defTabSz="914400" rtl="0" eaLnBrk="0" fontAlgn="base" latinLnBrk="0" hangingPunct="0">
+              <a:lnSpc>
+                <a:spcPct val="100000"/>
+              </a:lnSpc>
+              <a:spcBef>
+                <a:spcPct val="0"/>
+              </a:spcBef>
+              <a:spcAft>
+                <a:spcPct val="0"/>
+              </a:spcAft>
+              <a:buClrTx/>
+              <a:buSzTx/>
+              <a:buFontTx/>
+              <a:buChar char="•"/>
+              <a:tabLst/>
+            </a:pPr>
+            <a:r>
+              <a:rPr kumimoji="0" lang="en-US" altLang="en-US" sz="1000" b="0" i="0" u="none" strike="noStrike" cap="none" normalizeH="0" baseline="0" dirty="0">
+                <a:ln>
+                  <a:noFill/>
+                </a:ln>
+                <a:solidFill>
+                  <a:srgbClr val="333D42"/>
+                </a:solidFill>
+                <a:effectLst/>
+                <a:latin typeface="-apple-system"/>
+              </a:rPr>
+              <a:t>Standard: 30 seconds</a:t>
+            </a:r>
+          </a:p>
+          <a:p>
+            <a:pPr marL="0" marR="0" lvl="0" indent="0" algn="l" defTabSz="914400" rtl="0" eaLnBrk="0" fontAlgn="base" latinLnBrk="0" hangingPunct="0">
+              <a:lnSpc>
+                <a:spcPct val="100000"/>
+              </a:lnSpc>
+              <a:spcBef>
+                <a:spcPct val="0"/>
+              </a:spcBef>
+              <a:spcAft>
+                <a:spcPct val="0"/>
+              </a:spcAft>
+              <a:buClrTx/>
+              <a:buSzTx/>
+              <a:buFontTx/>
+              <a:buChar char="•"/>
+              <a:tabLst/>
+            </a:pPr>
+            <a:r>
+              <a:rPr kumimoji="0" lang="en-US" altLang="en-US" sz="1000" b="0" i="0" u="none" strike="noStrike" cap="none" normalizeH="0" baseline="0" dirty="0">
+                <a:ln>
+                  <a:noFill/>
+                </a:ln>
+                <a:solidFill>
+                  <a:srgbClr val="333D42"/>
+                </a:solidFill>
+                <a:effectLst/>
+                <a:latin typeface="-apple-system"/>
+              </a:rPr>
+              <a:t>Class 170 &amp; 185s: 45 seconds</a:t>
+            </a:r>
+          </a:p>
+          <a:p>
+            <a:pPr marL="0" marR="0" lvl="0" indent="0" algn="l" defTabSz="914400" rtl="0" eaLnBrk="0" fontAlgn="base" latinLnBrk="0" hangingPunct="0">
+              <a:lnSpc>
+                <a:spcPct val="100000"/>
+              </a:lnSpc>
+              <a:spcBef>
+                <a:spcPct val="0"/>
+              </a:spcBef>
+              <a:spcAft>
+                <a:spcPct val="0"/>
+              </a:spcAft>
+              <a:buClrTx/>
+              <a:buSzTx/>
+              <a:buFontTx/>
+              <a:buChar char="•"/>
+              <a:tabLst/>
+            </a:pPr>
+            <a:r>
+              <a:rPr kumimoji="0" lang="en-US" altLang="en-US" sz="1000" b="0" i="0" u="none" strike="noStrike" cap="none" normalizeH="0" baseline="0" dirty="0">
+                <a:ln>
+                  <a:noFill/>
+                </a:ln>
+                <a:solidFill>
+                  <a:srgbClr val="333D42"/>
+                </a:solidFill>
+                <a:effectLst/>
+                <a:latin typeface="-apple-system"/>
+              </a:rPr>
+              <a:t>Class 22x: 1 minute 30 seconds</a:t>
+            </a:r>
+          </a:p>
+          <a:p>
+            <a:pPr marL="0" marR="0" lvl="0" indent="0" algn="l" defTabSz="914400" rtl="0" eaLnBrk="0" fontAlgn="base" latinLnBrk="0" hangingPunct="0">
+              <a:lnSpc>
+                <a:spcPct val="100000"/>
+              </a:lnSpc>
+              <a:spcBef>
+                <a:spcPct val="0"/>
+              </a:spcBef>
+              <a:spcAft>
+                <a:spcPct val="0"/>
+              </a:spcAft>
+              <a:buClrTx/>
+              <a:buSzTx/>
+              <a:buFontTx/>
+              <a:buChar char="•"/>
+              <a:tabLst/>
+            </a:pPr>
+            <a:r>
+              <a:rPr kumimoji="0" lang="en-US" altLang="en-US" sz="1000" b="0" i="0" u="none" strike="noStrike" cap="none" normalizeH="0" baseline="0" dirty="0">
+                <a:ln>
+                  <a:noFill/>
+                </a:ln>
+                <a:solidFill>
+                  <a:srgbClr val="333D42"/>
+                </a:solidFill>
+                <a:effectLst/>
+                <a:latin typeface="-apple-system"/>
+              </a:rPr>
+              <a:t>Class 350: 45 seconds</a:t>
+            </a:r>
+          </a:p>
+          <a:p>
+            <a:pPr marL="0" marR="0" lvl="0" indent="0" algn="l" defTabSz="914400" rtl="0" eaLnBrk="0" fontAlgn="base" latinLnBrk="0" hangingPunct="0">
+              <a:lnSpc>
+                <a:spcPct val="100000"/>
+              </a:lnSpc>
+              <a:spcBef>
+                <a:spcPct val="0"/>
+              </a:spcBef>
+              <a:spcAft>
+                <a:spcPct val="0"/>
+              </a:spcAft>
+              <a:buClrTx/>
+              <a:buSzTx/>
+              <a:buFontTx/>
+              <a:buChar char="•"/>
+              <a:tabLst/>
+            </a:pPr>
+            <a:r>
+              <a:rPr kumimoji="0" lang="en-US" altLang="en-US" sz="1000" b="0" i="0" u="none" strike="noStrike" cap="none" normalizeH="0" baseline="0" dirty="0">
+                <a:ln>
+                  <a:noFill/>
+                </a:ln>
+                <a:solidFill>
+                  <a:srgbClr val="333D42"/>
+                </a:solidFill>
+                <a:effectLst/>
+                <a:latin typeface="-apple-system"/>
+              </a:rPr>
+              <a:t>Class 80x: 2 minutes (AWC) or 1 minute 30 seconds (TPE)</a:t>
+            </a:r>
+          </a:p>
+          <a:p>
+            <a:pPr marL="0" marR="0" lvl="0" indent="0" algn="l" defTabSz="914400" rtl="0" eaLnBrk="0" fontAlgn="base" latinLnBrk="0" hangingPunct="0">
+              <a:lnSpc>
+                <a:spcPct val="100000"/>
+              </a:lnSpc>
+              <a:spcBef>
+                <a:spcPct val="0"/>
+              </a:spcBef>
+              <a:spcAft>
+                <a:spcPct val="0"/>
+              </a:spcAft>
+              <a:buClrTx/>
+              <a:buSzTx/>
+              <a:buFontTx/>
+              <a:buChar char="•"/>
+              <a:tabLst/>
+            </a:pPr>
+            <a:r>
+              <a:rPr kumimoji="0" lang="en-US" altLang="en-US" sz="1000" b="0" i="0" u="none" strike="noStrike" cap="none" normalizeH="0" baseline="0" dirty="0">
+                <a:ln>
+                  <a:noFill/>
+                </a:ln>
+                <a:solidFill>
+                  <a:srgbClr val="333D42"/>
+                </a:solidFill>
+                <a:effectLst/>
+                <a:latin typeface="-apple-system"/>
+              </a:rPr>
+              <a:t>Loco Hauled: 1 minute</a:t>
+            </a:r>
+          </a:p>
+          <a:p>
+            <a:pPr marL="0" marR="0" lvl="0" indent="0" algn="l" defTabSz="914400" rtl="0" eaLnBrk="0" fontAlgn="base" latinLnBrk="0" hangingPunct="0">
+              <a:lnSpc>
+                <a:spcPct val="100000"/>
+              </a:lnSpc>
+              <a:spcBef>
+                <a:spcPct val="0"/>
+              </a:spcBef>
+              <a:spcAft>
+                <a:spcPct val="0"/>
+              </a:spcAft>
+              <a:buClrTx/>
+              <a:buSzTx/>
+              <a:buFontTx/>
+              <a:buChar char="•"/>
+              <a:tabLst/>
+            </a:pPr>
+            <a:r>
+              <a:rPr kumimoji="0" lang="en-US" altLang="en-US" sz="1000" b="0" i="0" u="none" strike="noStrike" cap="none" normalizeH="0" baseline="0" dirty="0">
+                <a:ln>
+                  <a:noFill/>
+                </a:ln>
+                <a:solidFill>
+                  <a:srgbClr val="333D42"/>
+                </a:solidFill>
+                <a:effectLst/>
+                <a:latin typeface="-apple-system"/>
+              </a:rPr>
+              <a:t>HST: 1 minute and 30 seconds</a:t>
+            </a:r>
+          </a:p>
+          <a:p>
+            <a:pPr marL="0" marR="0" lvl="0" indent="0" algn="l" defTabSz="914400" rtl="0" eaLnBrk="0" fontAlgn="base" latinLnBrk="0" hangingPunct="0">
+              <a:lnSpc>
+                <a:spcPct val="100000"/>
+              </a:lnSpc>
+              <a:spcBef>
+                <a:spcPct val="0"/>
+              </a:spcBef>
+              <a:spcAft>
+                <a:spcPct val="0"/>
+              </a:spcAft>
+              <a:buClrTx/>
+              <a:buSzTx/>
+              <a:buFontTx/>
+              <a:buNone/>
+              <a:tabLst/>
+            </a:pPr>
+            <a:r>
+              <a:rPr kumimoji="0" lang="en-US" altLang="en-US" sz="1000" b="0" i="0" u="none" strike="noStrike" cap="none" normalizeH="0" baseline="0" dirty="0">
+                <a:ln>
+                  <a:noFill/>
+                </a:ln>
+                <a:solidFill>
+                  <a:srgbClr val="333D42"/>
+                </a:solidFill>
+                <a:effectLst/>
+                <a:latin typeface="-apple-system"/>
+              </a:rPr>
+              <a:t>You also have standard information on platform reoccupation - 3 minutes same direction for example.</a:t>
+            </a:r>
+          </a:p>
+          <a:p>
+            <a:pPr marL="0" lvl="0" indent="0">
+              <a:lnSpc>
+                <a:spcPct val="100000"/>
+              </a:lnSpc>
+              <a:buNone/>
+            </a:pPr>
+            <a:r>
+              <a:rPr lang="en-US" altLang="en-US" sz="1000" dirty="0"/>
+              <a:t>https://</a:t>
+            </a:r>
+            <a:r>
+              <a:rPr lang="en-US" altLang="en-US" sz="1000" dirty="0" err="1"/>
+              <a:t>www.networkrail.co.uk</a:t>
+            </a:r>
+            <a:r>
+              <a:rPr lang="en-US" altLang="en-US" sz="1000" dirty="0"/>
+              <a:t>/industry-and-commercial/information-for-operators/operational-rules/</a:t>
+            </a:r>
+            <a:endParaRPr kumimoji="0" lang="en-US" altLang="en-US" sz="1000" b="0" i="0" u="none" strike="noStrike" cap="none" normalizeH="0" baseline="0" dirty="0">
+              <a:ln>
+                <a:noFill/>
+              </a:ln>
+              <a:solidFill>
+                <a:schemeClr val="tx1"/>
+              </a:solidFill>
+              <a:effectLst/>
+            </a:endParaRPr>
+          </a:p>
+          <a:p>
+            <a:pPr marL="0" marR="0" lvl="0" indent="0" algn="l" defTabSz="914400" rtl="0" eaLnBrk="0" fontAlgn="base" latinLnBrk="0" hangingPunct="0">
+              <a:lnSpc>
+                <a:spcPct val="100000"/>
+              </a:lnSpc>
+              <a:spcBef>
+                <a:spcPct val="0"/>
+              </a:spcBef>
+              <a:spcAft>
+                <a:spcPct val="0"/>
+              </a:spcAft>
+              <a:buClrTx/>
+              <a:buSzTx/>
+              <a:buFontTx/>
+              <a:buNone/>
+              <a:tabLst/>
+            </a:pPr>
+            <a:br>
+              <a:rPr kumimoji="0" lang="en-US" altLang="en-US" sz="1800" b="0" i="0" u="none" strike="noStrike" cap="none" normalizeH="0" baseline="0" dirty="0">
+                <a:ln>
+                  <a:noFill/>
+                </a:ln>
+                <a:solidFill>
+                  <a:schemeClr val="tx1"/>
+                </a:solidFill>
+                <a:effectLst/>
+                <a:latin typeface="Arial" panose="020B0604020202020204" pitchFamily="34" charset="0"/>
+              </a:rPr>
+            </a:br>
+            <a:endParaRPr kumimoji="0" lang="en-US" altLang="en-US" sz="1800" b="0" i="0" u="none" strike="noStrike" cap="none" normalizeH="0" baseline="0" dirty="0">
+              <a:ln>
+                <a:noFill/>
+              </a:ln>
+              <a:solidFill>
+                <a:schemeClr val="tx1"/>
+              </a:solidFill>
+              <a:effectLst/>
+              <a:latin typeface="Arial" panose="020B0604020202020204" pitchFamily="34" charset="0"/>
+            </a:endParaRPr>
+          </a:p>
+        </p:txBody>
+      </p:sp>
+      <p:sp>
+        <p:nvSpPr>
+          <p:cNvPr id="6" name="Rectangle 2">
+            <a:extLst>
+              <a:ext uri="{FF2B5EF4-FFF2-40B4-BE49-F238E27FC236}">
+                <a16:creationId xmlns:a16="http://schemas.microsoft.com/office/drawing/2014/main" id="{0AB17ECA-B0B5-2304-DB79-2800D9947046}"/>
+              </a:ext>
+            </a:extLst>
+          </p:cNvPr>
+          <p:cNvSpPr>
+            <a:spLocks noChangeArrowheads="1"/>
+          </p:cNvSpPr>
+          <p:nvPr/>
+        </p:nvSpPr>
+        <p:spPr bwMode="auto">
+          <a:xfrm>
+            <a:off x="0" y="0"/>
+            <a:ext cx="12192000" cy="457200"/>
+          </a:xfrm>
+          <a:prstGeom prst="rect">
+            <a:avLst/>
+          </a:prstGeom>
+          <a:noFill/>
+          <a:ln>
+            <a:noFill/>
+          </a:ln>
+          <a:effectLst/>
+          <a:extLst>
+            <a:ext uri="{909E8E84-426E-40DD-AFC4-6F175D3DCCD1}">
+              <a14:hiddenFill xmlns:a14="http://schemas.microsoft.com/office/drawing/2010/main">
+                <a:solidFill>
+                  <a:schemeClr val="accent1"/>
+                </a:solidFill>
+              </a14:hiddenFill>
+            </a:ext>
+            <a:ext uri="{91240B29-F687-4F45-9708-019B960494DF}">
+              <a14:hiddenLine xmlns:a14="http://schemas.microsoft.com/office/drawing/2010/main" w="9525">
+                <a:solidFill>
+                  <a:schemeClr val="tx1"/>
+                </a:solidFill>
+                <a:miter lim="800000"/>
+                <a:headEnd/>
+                <a:tailEnd/>
+              </a14:hiddenLine>
+            </a:ext>
+            <a:ext uri="{AF507438-7753-43E0-B8FC-AC1667EBCBE1}">
+              <a14:hiddenEffects xmlns:a14="http://schemas.microsoft.com/office/drawing/2010/main">
+                <a:effectLst>
+                  <a:outerShdw dist="35921" dir="2700000" algn="ctr" rotWithShape="0">
+                    <a:schemeClr val="bg2"/>
+                  </a:outerShdw>
+                </a:effectLst>
+              </a14:hiddenEffects>
+            </a:ext>
+          </a:extLst>
+        </p:spPr>
+        <p:txBody>
+          <a:bodyPr vert="horz" wrap="none" lIns="91440" tIns="45720" rIns="91440" bIns="45720" numCol="1" anchor="ctr" anchorCtr="0" compatLnSpc="1">
+            <a:prstTxWarp prst="textNoShape">
+              <a:avLst/>
+            </a:prstTxWarp>
+            <a:spAutoFit/>
+          </a:bodyPr>
+          <a:lstStyle>
+            <a:lvl1pPr eaLnBrk="0" fontAlgn="base" hangingPunct="0">
+              <a:spcBef>
+                <a:spcPct val="0"/>
+              </a:spcBef>
+              <a:spcAft>
+                <a:spcPct val="0"/>
+              </a:spcAft>
+              <a:defRPr>
+                <a:solidFill>
+                  <a:schemeClr val="tx1"/>
+                </a:solidFill>
+                <a:latin typeface="Arial" panose="020B0604020202020204" pitchFamily="34" charset="0"/>
+              </a:defRPr>
+            </a:lvl1pPr>
+            <a:lvl2pPr eaLnBrk="0" fontAlgn="base" hangingPunct="0">
+              <a:spcBef>
+                <a:spcPct val="0"/>
+              </a:spcBef>
+              <a:spcAft>
+                <a:spcPct val="0"/>
+              </a:spcAft>
+              <a:defRPr>
+                <a:solidFill>
+                  <a:schemeClr val="tx1"/>
+                </a:solidFill>
+                <a:latin typeface="Arial" panose="020B0604020202020204" pitchFamily="34" charset="0"/>
+              </a:defRPr>
+            </a:lvl2pPr>
+            <a:lvl3pPr eaLnBrk="0" fontAlgn="base" hangingPunct="0">
+              <a:spcBef>
+                <a:spcPct val="0"/>
+              </a:spcBef>
+              <a:spcAft>
+                <a:spcPct val="0"/>
+              </a:spcAft>
+              <a:defRPr>
+                <a:solidFill>
+                  <a:schemeClr val="tx1"/>
+                </a:solidFill>
+                <a:latin typeface="Arial" panose="020B0604020202020204" pitchFamily="34" charset="0"/>
+              </a:defRPr>
+            </a:lvl3pPr>
+            <a:lvl4pPr eaLnBrk="0" fontAlgn="base" hangingPunct="0">
+              <a:spcBef>
+                <a:spcPct val="0"/>
+              </a:spcBef>
+              <a:spcAft>
+                <a:spcPct val="0"/>
+              </a:spcAft>
+              <a:defRPr>
+                <a:solidFill>
+                  <a:schemeClr val="tx1"/>
+                </a:solidFill>
+                <a:latin typeface="Arial" panose="020B0604020202020204" pitchFamily="34" charset="0"/>
+              </a:defRPr>
+            </a:lvl4pPr>
+            <a:lvl5pPr eaLnBrk="0" fontAlgn="base" hangingPunct="0">
+              <a:spcBef>
+                <a:spcPct val="0"/>
+              </a:spcBef>
+              <a:spcAft>
+                <a:spcPct val="0"/>
+              </a:spcAft>
+              <a:defRPr>
+                <a:solidFill>
+                  <a:schemeClr val="tx1"/>
+                </a:solidFill>
+                <a:latin typeface="Arial" panose="020B0604020202020204" pitchFamily="34" charset="0"/>
+              </a:defRPr>
+            </a:lvl5pPr>
+            <a:lvl6pPr eaLnBrk="0" fontAlgn="base" hangingPunct="0">
+              <a:spcBef>
+                <a:spcPct val="0"/>
+              </a:spcBef>
+              <a:spcAft>
+                <a:spcPct val="0"/>
+              </a:spcAft>
+              <a:defRPr>
+                <a:solidFill>
+                  <a:schemeClr val="tx1"/>
+                </a:solidFill>
+                <a:latin typeface="Arial" panose="020B0604020202020204" pitchFamily="34" charset="0"/>
+              </a:defRPr>
+            </a:lvl6pPr>
+            <a:lvl7pPr eaLnBrk="0" fontAlgn="base" hangingPunct="0">
+              <a:spcBef>
+                <a:spcPct val="0"/>
+              </a:spcBef>
+              <a:spcAft>
+                <a:spcPct val="0"/>
+              </a:spcAft>
+              <a:defRPr>
+                <a:solidFill>
+                  <a:schemeClr val="tx1"/>
+                </a:solidFill>
+                <a:latin typeface="Arial" panose="020B0604020202020204" pitchFamily="34" charset="0"/>
+              </a:defRPr>
+            </a:lvl7pPr>
+            <a:lvl8pPr eaLnBrk="0" fontAlgn="base" hangingPunct="0">
+              <a:spcBef>
+                <a:spcPct val="0"/>
+              </a:spcBef>
+              <a:spcAft>
+                <a:spcPct val="0"/>
+              </a:spcAft>
+              <a:defRPr>
+                <a:solidFill>
+                  <a:schemeClr val="tx1"/>
+                </a:solidFill>
+                <a:latin typeface="Arial" panose="020B0604020202020204" pitchFamily="34" charset="0"/>
+              </a:defRPr>
+            </a:lvl8pPr>
+            <a:lvl9pPr eaLnBrk="0" fontAlgn="base" hangingPunct="0">
+              <a:spcBef>
+                <a:spcPct val="0"/>
+              </a:spcBef>
+              <a:spcAft>
+                <a:spcPct val="0"/>
+              </a:spcAft>
+              <a:defRPr>
+                <a:solidFill>
+                  <a:schemeClr val="tx1"/>
+                </a:solidFill>
+                <a:latin typeface="Arial" panose="020B0604020202020204" pitchFamily="34" charset="0"/>
+              </a:defRPr>
+            </a:lvl9pPr>
+          </a:lstStyle>
+          <a:p>
+            <a:pPr marL="0" marR="0" lvl="0" indent="0" algn="l" defTabSz="914400" rtl="0" eaLnBrk="0" fontAlgn="base" latinLnBrk="0" hangingPunct="0">
+              <a:lnSpc>
+                <a:spcPct val="100000"/>
+              </a:lnSpc>
+              <a:spcBef>
+                <a:spcPct val="0"/>
+              </a:spcBef>
+              <a:spcAft>
+                <a:spcPct val="0"/>
+              </a:spcAft>
+              <a:buClrTx/>
+              <a:buSzTx/>
+              <a:buFontTx/>
+              <a:buNone/>
+              <a:tabLst/>
+            </a:pPr>
+            <a:r>
+              <a:rPr kumimoji="0" lang="en-US" altLang="en-US" sz="1000" b="0" i="0" u="none" strike="noStrike" cap="none" normalizeH="0" baseline="0">
+                <a:ln>
+                  <a:noFill/>
+                </a:ln>
+                <a:solidFill>
+                  <a:srgbClr val="333D42"/>
+                </a:solidFill>
+                <a:effectLst/>
+                <a:latin typeface="-apple-system"/>
+              </a:rPr>
+              <a:t>The Thameslink core is timetabled for a maximum of 24tph, a train every 2.5 minutes. Each train is expected to stand for 60 seconds, with 47 seconds of doors open and 13 total of opening and closing doors. That route runs on ATO (Automatic Train Operation) where the driver only closes the doors.</a:t>
+            </a:r>
+            <a:endParaRPr kumimoji="0" lang="en-US" altLang="en-US" sz="1000" b="0" i="0" u="none" strike="noStrike" cap="none" normalizeH="0" baseline="0">
+              <a:ln>
+                <a:noFill/>
+              </a:ln>
+              <a:solidFill>
+                <a:schemeClr val="tx1"/>
+              </a:solidFill>
+              <a:effectLst/>
+            </a:endParaRPr>
+          </a:p>
+          <a:p>
+            <a:pPr marL="0" marR="0" lvl="0" indent="0" algn="l" defTabSz="914400" rtl="0" eaLnBrk="0" fontAlgn="base" latinLnBrk="0" hangingPunct="0">
+              <a:lnSpc>
+                <a:spcPct val="100000"/>
+              </a:lnSpc>
+              <a:spcBef>
+                <a:spcPct val="0"/>
+              </a:spcBef>
+              <a:spcAft>
+                <a:spcPct val="0"/>
+              </a:spcAft>
+              <a:buClrTx/>
+              <a:buSzTx/>
+              <a:buFontTx/>
+              <a:buNone/>
+              <a:tabLst/>
+            </a:pPr>
+            <a:r>
+              <a:rPr kumimoji="0" lang="en-US" altLang="en-US" sz="1000" b="0" i="0" u="none" strike="noStrike" cap="none" normalizeH="0" baseline="0">
+                <a:ln>
+                  <a:noFill/>
+                </a:ln>
+                <a:solidFill>
+                  <a:srgbClr val="333D42"/>
+                </a:solidFill>
+                <a:effectLst/>
+                <a:latin typeface="-apple-system"/>
+              </a:rPr>
+              <a:t>Intercity trains will usually be timetabled for a minimum of 2 minutes at each station, and usually 3+ at major stations.</a:t>
+            </a:r>
+            <a:endParaRPr kumimoji="0" lang="en-US" altLang="en-US" sz="1000" b="0" i="0" u="none" strike="noStrike" cap="none" normalizeH="0" baseline="0">
+              <a:ln>
+                <a:noFill/>
+              </a:ln>
+              <a:solidFill>
+                <a:schemeClr val="tx1"/>
+              </a:solidFill>
+              <a:effectLst/>
+            </a:endParaRPr>
+          </a:p>
+          <a:p>
+            <a:pPr marL="0" marR="0" lvl="0" indent="0" algn="l" defTabSz="914400" rtl="0" eaLnBrk="0" fontAlgn="base" latinLnBrk="0" hangingPunct="0">
+              <a:lnSpc>
+                <a:spcPct val="100000"/>
+              </a:lnSpc>
+              <a:spcBef>
+                <a:spcPct val="0"/>
+              </a:spcBef>
+              <a:spcAft>
+                <a:spcPct val="0"/>
+              </a:spcAft>
+              <a:buClrTx/>
+              <a:buSzTx/>
+              <a:buFontTx/>
+              <a:buNone/>
+              <a:tabLst/>
+            </a:pPr>
+            <a:r>
+              <a:rPr kumimoji="0" lang="en-US" altLang="en-US" sz="1000" b="0" i="0" u="none" strike="noStrike" cap="none" normalizeH="0" baseline="0">
+                <a:ln>
+                  <a:noFill/>
+                </a:ln>
+                <a:solidFill>
+                  <a:srgbClr val="333D42"/>
+                </a:solidFill>
+                <a:effectLst/>
+                <a:latin typeface="-apple-system"/>
+              </a:rPr>
+              <a:t>Despite Thameslink trains taking more people, it’s a lot easier to get on/off Thameslink trains than, say, IETs or HSTs - due to the differences in standing capacity, door location and luggage storage.</a:t>
+            </a:r>
+            <a:endParaRPr kumimoji="0" lang="en-US" altLang="en-US" sz="1800" b="0" i="0" u="none" strike="noStrike" cap="none" normalizeH="0" baseline="0">
+              <a:ln>
+                <a:noFill/>
+              </a:ln>
+              <a:solidFill>
+                <a:schemeClr val="tx1"/>
+              </a:solidFill>
+              <a:effectLst/>
+              <a:latin typeface="Arial" panose="020B0604020202020204" pitchFamily="34" charset="0"/>
+            </a:endParaRPr>
+          </a:p>
+        </p:txBody>
+      </p:sp>
+      <p:sp>
+        <p:nvSpPr>
+          <p:cNvPr id="7" name="TextBox 6">
+            <a:extLst>
+              <a:ext uri="{FF2B5EF4-FFF2-40B4-BE49-F238E27FC236}">
+                <a16:creationId xmlns:a16="http://schemas.microsoft.com/office/drawing/2014/main" id="{81B7BFB4-1A8A-9A1B-DA27-E605BAD466CC}"/>
+              </a:ext>
+            </a:extLst>
+          </p:cNvPr>
+          <p:cNvSpPr txBox="1"/>
+          <p:nvPr/>
+        </p:nvSpPr>
+        <p:spPr>
+          <a:xfrm>
+            <a:off x="7905509" y="2118167"/>
+            <a:ext cx="11359776" cy="369332"/>
+          </a:xfrm>
+          <a:prstGeom prst="rect">
+            <a:avLst/>
+          </a:prstGeom>
+          <a:noFill/>
+        </p:spPr>
+        <p:txBody>
+          <a:bodyPr wrap="none" rtlCol="0">
+            <a:spAutoFit/>
+          </a:bodyPr>
+          <a:lstStyle/>
+          <a:p>
+            <a:r>
+              <a:rPr lang="en-GB" b="1" dirty="0"/>
+              <a:t>0.90 passengers per second per door</a:t>
+            </a:r>
+            <a:r>
+              <a:rPr lang="en-GB" dirty="0"/>
+              <a:t>, with median values often around </a:t>
+            </a:r>
+            <a:r>
+              <a:rPr lang="en-GB" b="1" dirty="0"/>
+              <a:t>0.82 passengers per second per door</a:t>
+            </a:r>
+            <a:r>
+              <a:rPr lang="en-GB" dirty="0"/>
+              <a:t>. </a:t>
+            </a:r>
+          </a:p>
+        </p:txBody>
+      </p:sp>
+      <p:sp>
+        <p:nvSpPr>
+          <p:cNvPr id="8" name="TextBox 7">
+            <a:extLst>
+              <a:ext uri="{FF2B5EF4-FFF2-40B4-BE49-F238E27FC236}">
+                <a16:creationId xmlns:a16="http://schemas.microsoft.com/office/drawing/2014/main" id="{A431EC14-BEA7-8A58-D346-DBA7C8CDC3C8}"/>
+              </a:ext>
+            </a:extLst>
+          </p:cNvPr>
+          <p:cNvSpPr txBox="1"/>
+          <p:nvPr/>
+        </p:nvSpPr>
+        <p:spPr>
+          <a:xfrm>
+            <a:off x="5231757" y="5015547"/>
+            <a:ext cx="6960243" cy="2031325"/>
+          </a:xfrm>
+          <a:prstGeom prst="rect">
+            <a:avLst/>
+          </a:prstGeom>
+          <a:noFill/>
+        </p:spPr>
+        <p:txBody>
+          <a:bodyPr wrap="square" rtlCol="0">
+            <a:spAutoFit/>
+          </a:bodyPr>
+          <a:lstStyle/>
+          <a:p>
+            <a:r>
+              <a:rPr lang="en-GB" dirty="0"/>
+              <a:t>Lidar can </a:t>
+            </a:r>
+            <a:r>
+              <a:rPr lang="en-GB" dirty="0" err="1"/>
+              <a:t>idneify</a:t>
+            </a:r>
+            <a:r>
+              <a:rPr lang="en-GB" dirty="0"/>
+              <a:t> other passenger types such as wheelchair users or people with</a:t>
+            </a:r>
+            <a:br>
+              <a:rPr lang="en-GB" dirty="0"/>
+            </a:br>
+            <a:r>
+              <a:rPr lang="en-GB" dirty="0"/>
+              <a:t>bicycles to adjust boarding rate: </a:t>
+            </a:r>
+            <a:br>
+              <a:rPr lang="en-GB" dirty="0"/>
+            </a:br>
+            <a:r>
+              <a:rPr lang="en-GB" dirty="0"/>
+              <a:t>if there’s a big </a:t>
+            </a:r>
+            <a:r>
+              <a:rPr lang="en-GB" dirty="0" err="1"/>
+              <a:t>cyclying</a:t>
+            </a:r>
+            <a:r>
+              <a:rPr lang="en-GB" dirty="0"/>
+              <a:t> event boarding rate can be adjusted and dwell time updated on database for the context of the event that happened on that day. </a:t>
+            </a:r>
+            <a:br>
+              <a:rPr lang="en-GB" dirty="0"/>
+            </a:br>
+            <a:endParaRPr lang="en-GB" dirty="0"/>
+          </a:p>
+        </p:txBody>
+      </p:sp>
+      <p:sp>
+        <p:nvSpPr>
+          <p:cNvPr id="9" name="TextBox 8">
+            <a:extLst>
+              <a:ext uri="{FF2B5EF4-FFF2-40B4-BE49-F238E27FC236}">
+                <a16:creationId xmlns:a16="http://schemas.microsoft.com/office/drawing/2014/main" id="{E9474025-7501-D002-2F40-74524A141E40}"/>
+              </a:ext>
+            </a:extLst>
+          </p:cNvPr>
+          <p:cNvSpPr txBox="1"/>
+          <p:nvPr/>
+        </p:nvSpPr>
+        <p:spPr>
+          <a:xfrm>
+            <a:off x="9560689" y="3715473"/>
+            <a:ext cx="8600881" cy="646331"/>
+          </a:xfrm>
+          <a:prstGeom prst="rect">
+            <a:avLst/>
+          </a:prstGeom>
+          <a:noFill/>
+        </p:spPr>
+        <p:txBody>
+          <a:bodyPr wrap="none" rtlCol="0">
+            <a:spAutoFit/>
+          </a:bodyPr>
+          <a:lstStyle/>
+          <a:p>
+            <a:r>
+              <a:rPr lang="en-GB" dirty="0"/>
+              <a:t>Different nudge techniques </a:t>
+            </a:r>
+            <a:r>
+              <a:rPr lang="en-GB" dirty="0" err="1"/>
+              <a:t>ssuch</a:t>
+            </a:r>
+            <a:r>
+              <a:rPr lang="en-GB" dirty="0"/>
+              <a:t> as mobile phones or </a:t>
+            </a:r>
+            <a:r>
+              <a:rPr lang="en-GB" dirty="0" err="1"/>
+              <a:t>itneltigent</a:t>
+            </a:r>
+            <a:r>
+              <a:rPr lang="en-GB" dirty="0"/>
+              <a:t> lighting on platform</a:t>
+            </a:r>
+          </a:p>
+          <a:p>
+            <a:r>
+              <a:rPr lang="en-GB" dirty="0"/>
+              <a:t>Or dynamic LED </a:t>
+            </a:r>
+            <a:r>
+              <a:rPr lang="en-GB" dirty="0" err="1"/>
+              <a:t>screesn</a:t>
+            </a:r>
+            <a:endParaRPr lang="en-GB" dirty="0"/>
+          </a:p>
+        </p:txBody>
+      </p:sp>
+    </p:spTree>
+    <p:extLst>
+      <p:ext uri="{BB962C8B-B14F-4D97-AF65-F5344CB8AC3E}">
+        <p14:creationId xmlns:p14="http://schemas.microsoft.com/office/powerpoint/2010/main" val="2866356449"/>
+      </p:ext>
+    </p:extLst>
+  </p:cSld>
+  <p:clrMapOvr>
+    <a:masterClrMapping/>
+  </p:clrMapOvr>
+</p:sld>
+</file>
+
+<file path=ppt/slides/slide3.xml><?xml version="1.0" encoding="utf-8"?>
+<p:sld xmlns:a="http://schemas.openxmlformats.org/drawingml/2006/main" xmlns:r="http://schemas.openxmlformats.org/officeDocument/2006/relationships" xmlns:p="http://schemas.openxmlformats.org/presentationml/2006/main">
+  <p:cSld>
+    <p:spTree>
+      <p:nvGrpSpPr>
+        <p:cNvPr id="1" name=""/>
+        <p:cNvGrpSpPr/>
+        <p:nvPr/>
+      </p:nvGrpSpPr>
+      <p:grpSpPr>
+        <a:xfrm>
+          <a:off x="0" y="0"/>
+          <a:ext cx="0" cy="0"/>
+          <a:chOff x="0" y="0"/>
+          <a:chExt cx="0" cy="0"/>
+        </a:xfrm>
+      </p:grpSpPr>
       <p:pic>
         <p:nvPicPr>
           <p:cNvPr id="5" name="Picture 4">
@@ -3450,7 +4559,7 @@
         <p:spPr>
           <a:xfrm>
             <a:off x="2615878" y="831327"/>
-            <a:ext cx="4808304" cy="369332"/>
+            <a:ext cx="4517390" cy="369332"/>
           </a:xfrm>
           <a:prstGeom prst="rect">
             <a:avLst/>
@@ -3465,7 +4574,15 @@
           <a:p>
             <a:r>
               <a:rPr lang="en-GB" dirty="0"/>
-              <a:t>INSERT PEDESTRIAL ICON HERE SO ITS CLEAR</a:t>
+              <a:t>INSERT </a:t>
+            </a:r>
+            <a:r>
+              <a:rPr lang="en-GB" dirty="0" err="1"/>
+              <a:t>Pedstrian</a:t>
+            </a:r>
+            <a:r>
+              <a:rPr lang="en-GB" dirty="0"/>
+              <a:t> ICON HERE SO ITS CLEAR</a:t>
             </a:r>
           </a:p>
         </p:txBody>
@@ -3800,7 +4917,7 @@
 </p:sld>
 </file>
 
-<file path=ppt/slides/slide3.xml><?xml version="1.0" encoding="utf-8"?>
+<file path=ppt/slides/slide4.xml><?xml version="1.0" encoding="utf-8"?>
 <p:sld xmlns:a="http://schemas.openxmlformats.org/drawingml/2006/main" xmlns:r="http://schemas.openxmlformats.org/officeDocument/2006/relationships" xmlns:p="http://schemas.openxmlformats.org/presentationml/2006/main">
   <p:cSld>
     <p:spTree>
@@ -3822,6 +4939,130 @@
           <p:cNvPr id="2" name="Title 1">
             <a:extLst>
               <a:ext uri="{FF2B5EF4-FFF2-40B4-BE49-F238E27FC236}">
+                <a16:creationId xmlns:a16="http://schemas.microsoft.com/office/drawing/2014/main" id="{2AD8D668-7042-7A42-0B4D-80B4CA7C02A0}"/>
+              </a:ext>
+            </a:extLst>
+          </p:cNvPr>
+          <p:cNvSpPr>
+            <a:spLocks noGrp="1"/>
+          </p:cNvSpPr>
+          <p:nvPr>
+            <p:ph type="title"/>
+          </p:nvPr>
+        </p:nvSpPr>
+        <p:spPr/>
+        <p:txBody>
+          <a:bodyPr/>
+          <a:lstStyle/>
+          <a:p>
+            <a:endParaRPr lang="en-GB"/>
+          </a:p>
+        </p:txBody>
+      </p:sp>
+      <p:sp>
+        <p:nvSpPr>
+          <p:cNvPr id="3" name="Content Placeholder 2">
+            <a:extLst>
+              <a:ext uri="{FF2B5EF4-FFF2-40B4-BE49-F238E27FC236}">
+                <a16:creationId xmlns:a16="http://schemas.microsoft.com/office/drawing/2014/main" id="{6DBD98F9-708D-DC77-DCFD-3FB1EF99F544}"/>
+              </a:ext>
+            </a:extLst>
+          </p:cNvPr>
+          <p:cNvSpPr>
+            <a:spLocks noGrp="1"/>
+          </p:cNvSpPr>
+          <p:nvPr>
+            <p:ph idx="1"/>
+          </p:nvPr>
+        </p:nvSpPr>
+        <p:spPr/>
+        <p:txBody>
+          <a:bodyPr/>
+          <a:lstStyle/>
+          <a:p>
+            <a:r>
+              <a:rPr lang="en-GB" dirty="0"/>
+              <a:t>Need to add google maps app </a:t>
+            </a:r>
+            <a:r>
+              <a:rPr lang="en-GB" dirty="0" err="1"/>
+              <a:t>mockups</a:t>
+            </a:r>
+            <a:r>
+              <a:rPr lang="en-GB" dirty="0"/>
+              <a:t> and trainline/ </a:t>
+            </a:r>
+            <a:r>
+              <a:rPr lang="en-GB" dirty="0" err="1"/>
+              <a:t>greatwestertn</a:t>
+            </a:r>
+            <a:r>
+              <a:rPr lang="en-GB" dirty="0"/>
+              <a:t> etc</a:t>
+            </a:r>
+          </a:p>
+          <a:p>
+            <a:r>
+              <a:rPr lang="en-GB" dirty="0"/>
+              <a:t>Need to add landing page with link to pdf of write up then link to </a:t>
+            </a:r>
+            <a:r>
+              <a:rPr lang="en-GB" dirty="0" err="1"/>
+              <a:t>dahsbord</a:t>
+            </a:r>
+            <a:r>
+              <a:rPr lang="en-GB" dirty="0"/>
+              <a:t>. </a:t>
+            </a:r>
+          </a:p>
+          <a:p>
+            <a:r>
+              <a:rPr lang="en-GB" dirty="0"/>
+              <a:t>Need to make video of Lidar at BTM with </a:t>
+            </a:r>
+            <a:r>
+              <a:rPr lang="en-GB" dirty="0" err="1"/>
+              <a:t>midjoruney</a:t>
+            </a:r>
+            <a:endParaRPr lang="en-GB" dirty="0"/>
+          </a:p>
+        </p:txBody>
+      </p:sp>
+    </p:spTree>
+    <p:extLst>
+      <p:ext uri="{BB962C8B-B14F-4D97-AF65-F5344CB8AC3E}">
+        <p14:creationId xmlns:p14="http://schemas.microsoft.com/office/powerpoint/2010/main" val="3476349791"/>
+      </p:ext>
+    </p:extLst>
+  </p:cSld>
+  <p:clrMapOvr>
+    <a:masterClrMapping/>
+  </p:clrMapOvr>
+</p:sld>
+</file>
+
+<file path=ppt/slides/slide5.xml><?xml version="1.0" encoding="utf-8"?>
+<p:sld xmlns:a="http://schemas.openxmlformats.org/drawingml/2006/main" xmlns:r="http://schemas.openxmlformats.org/officeDocument/2006/relationships" xmlns:p="http://schemas.openxmlformats.org/presentationml/2006/main">
+  <p:cSld>
+    <p:spTree>
+      <p:nvGrpSpPr>
+        <p:cNvPr id="1" name=""/>
+        <p:cNvGrpSpPr/>
+        <p:nvPr/>
+      </p:nvGrpSpPr>
+      <p:grpSpPr>
+        <a:xfrm>
+          <a:off x="0" y="0"/>
+          <a:ext cx="0" cy="0"/>
+          <a:chOff x="0" y="0"/>
+          <a:chExt cx="0" cy="0"/>
+        </a:xfrm>
+      </p:grpSpPr>
+      <p:sp>
+        <p:nvSpPr>
+          <p:cNvPr id="2" name="Title 1">
+            <a:extLst>
+              <a:ext uri="{FF2B5EF4-FFF2-40B4-BE49-F238E27FC236}">
                 <a16:creationId xmlns:a16="http://schemas.microsoft.com/office/drawing/2014/main" id="{7EC09EDE-FBF5-2BBB-0C72-8E5666DD92F0}"/>
               </a:ext>
             </a:extLst>
@@ -3994,7 +5235,7 @@
 </p:sld>
 </file>
 
-<file path=ppt/slides/slide4.xml><?xml version="1.0" encoding="utf-8"?>
+<file path=ppt/slides/slide6.xml><?xml version="1.0" encoding="utf-8"?>
 <p:sld xmlns:a="http://schemas.openxmlformats.org/drawingml/2006/main" xmlns:r="http://schemas.openxmlformats.org/officeDocument/2006/relationships" xmlns:p="http://schemas.openxmlformats.org/presentationml/2006/main">
   <p:cSld>
     <p:spTree>
@@ -4365,7 +5606,7 @@
 </p:sld>
 </file>
 
-<file path=ppt/slides/slide5.xml><?xml version="1.0" encoding="utf-8"?>
+<file path=ppt/slides/slide7.xml><?xml version="1.0" encoding="utf-8"?>
 <p:sld xmlns:a="http://schemas.openxmlformats.org/drawingml/2006/main" xmlns:r="http://schemas.openxmlformats.org/officeDocument/2006/relationships" xmlns:p="http://schemas.openxmlformats.org/presentationml/2006/main">
   <p:cSld>
     <p:spTree>

</xml_diff>